<commit_message>
Added model using avgtseries, superficial edits to docstrings and plots
</commit_message>
<xml_diff>
--- a/Five-Zip-Codes-In-Which-to-Invest.pptx
+++ b/Five-Zip-Codes-In-Which-to-Invest.pptx
@@ -1643,7 +1643,7 @@
         </a:p>
       </dsp:txBody>
       <dsp:txXfrm>
-        <a:off x="2116642" y="2346959"/>
+        <a:off x="2116642" y="2346960"/>
         <a:ext cx="948315" cy="670560"/>
       </dsp:txXfrm>
     </dsp:sp>
@@ -3429,7 +3429,7 @@
           <a:p>
             <a:fld id="{B8529874-8186-4B05-AB29-77F0E71AEB3E}" type="datetimeFigureOut">
               <a:rPr lang="en-US" smtClean="0"/>
-              <a:t>3/3/2020</a:t>
+              <a:t>3/4/2020</a:t>
             </a:fld>
             <a:endParaRPr lang="en-US"/>
           </a:p>
@@ -4143,7 +4143,7 @@
           <a:p>
             <a:fld id="{58D2F988-A9C3-42BC-BEB9-6887208FE8C4}" type="datetime1">
               <a:rPr lang="en-US" smtClean="0"/>
-              <a:t>3/3/2020</a:t>
+              <a:t>3/4/2020</a:t>
             </a:fld>
             <a:endParaRPr lang="en-US"/>
           </a:p>
@@ -4312,7 +4312,7 @@
           <a:p>
             <a:fld id="{71C2B2AC-E17E-4EE0-AE2C-DAA99776050B}" type="datetime1">
               <a:rPr lang="en-US" smtClean="0"/>
-              <a:t>3/3/2020</a:t>
+              <a:t>3/4/2020</a:t>
             </a:fld>
             <a:endParaRPr lang="en-US"/>
           </a:p>
@@ -4491,7 +4491,7 @@
           <a:p>
             <a:fld id="{EF5E9F22-4760-431B-BCCA-3313AF6D3539}" type="datetime1">
               <a:rPr lang="en-US" smtClean="0"/>
-              <a:t>3/3/2020</a:t>
+              <a:t>3/4/2020</a:t>
             </a:fld>
             <a:endParaRPr lang="en-US"/>
           </a:p>
@@ -4660,7 +4660,7 @@
           <a:p>
             <a:fld id="{F85226FC-A66F-4E31-AA02-2A8DDBB48DB9}" type="datetime1">
               <a:rPr lang="en-US" smtClean="0"/>
-              <a:t>3/3/2020</a:t>
+              <a:t>3/4/2020</a:t>
             </a:fld>
             <a:endParaRPr lang="en-US"/>
           </a:p>
@@ -4905,7 +4905,7 @@
           <a:p>
             <a:fld id="{ABE4F7C8-900F-4E5F-886A-6316AB19972B}" type="datetime1">
               <a:rPr lang="en-US" smtClean="0"/>
-              <a:t>3/3/2020</a:t>
+              <a:t>3/4/2020</a:t>
             </a:fld>
             <a:endParaRPr lang="en-US"/>
           </a:p>
@@ -5192,7 +5192,7 @@
           <a:p>
             <a:fld id="{1595BFED-D6BD-4453-85C7-C3888323074C}" type="datetime1">
               <a:rPr lang="en-US" smtClean="0"/>
-              <a:t>3/3/2020</a:t>
+              <a:t>3/4/2020</a:t>
             </a:fld>
             <a:endParaRPr lang="en-US"/>
           </a:p>
@@ -5625,7 +5625,7 @@
           <a:p>
             <a:fld id="{9B1ECA74-5AAC-4EF4-9AB9-6A995A31F094}" type="datetime1">
               <a:rPr lang="en-US" smtClean="0"/>
-              <a:t>3/3/2020</a:t>
+              <a:t>3/4/2020</a:t>
             </a:fld>
             <a:endParaRPr lang="en-US"/>
           </a:p>
@@ -5742,7 +5742,7 @@
           <a:p>
             <a:fld id="{0B3701BD-D14A-48E6-9805-A4F15245EEA0}" type="datetime1">
               <a:rPr lang="en-US" smtClean="0"/>
-              <a:t>3/3/2020</a:t>
+              <a:t>3/4/2020</a:t>
             </a:fld>
             <a:endParaRPr lang="en-US"/>
           </a:p>
@@ -5836,7 +5836,7 @@
           <a:p>
             <a:fld id="{19A7C50A-F857-4233-8392-EBDEBE1F189D}" type="datetime1">
               <a:rPr lang="en-US" smtClean="0"/>
-              <a:t>3/3/2020</a:t>
+              <a:t>3/4/2020</a:t>
             </a:fld>
             <a:endParaRPr lang="en-US"/>
           </a:p>
@@ -6029,7 +6029,7 @@
           <a:p>
             <a:fld id="{AD88447C-DFD9-4300-9E1C-CD0891204F87}" type="datetime1">
               <a:rPr lang="en-US" smtClean="0"/>
-              <a:t>3/3/2020</a:t>
+              <a:t>3/4/2020</a:t>
             </a:fld>
             <a:endParaRPr lang="en-US"/>
           </a:p>
@@ -6351,7 +6351,7 @@
           <a:p>
             <a:fld id="{2C974C37-F4F4-48EE-B725-C67776945BCF}" type="datetime1">
               <a:rPr lang="en-US" smtClean="0"/>
-              <a:t>3/3/2020</a:t>
+              <a:t>3/4/2020</a:t>
             </a:fld>
             <a:endParaRPr lang="en-US"/>
           </a:p>
@@ -6738,7 +6738,7 @@
           <a:p>
             <a:fld id="{C8889896-C819-4850-B221-9E69A594BA31}" type="datetime1">
               <a:rPr lang="en-US" smtClean="0"/>
-              <a:t>3/3/2020</a:t>
+              <a:t>3/4/2020</a:t>
             </a:fld>
             <a:endParaRPr lang="en-US"/>
           </a:p>
@@ -7416,15 +7416,64 @@
           </a:p>
         </p:txBody>
       </p:sp>
+      <p:sp>
+        <p:nvSpPr>
+          <p:cNvPr id="7" name="Text Placeholder 6"/>
+          <p:cNvSpPr>
+            <a:spLocks noGrp="1"/>
+          </p:cNvSpPr>
+          <p:nvPr>
+            <p:ph type="body" sz="quarter" idx="3"/>
+          </p:nvPr>
+        </p:nvSpPr>
+        <p:spPr>
+          <a:xfrm>
+            <a:off x="5029200" y="1524000"/>
+            <a:ext cx="3657600" cy="639762"/>
+          </a:xfrm>
+        </p:spPr>
+        <p:txBody>
+          <a:bodyPr/>
+          <a:lstStyle/>
+          <a:p>
+            <a:r>
+              <a:rPr lang="en-US" dirty="0" smtClean="0"/>
+              <a:t>Overall Average’s Prediction</a:t>
+            </a:r>
+            <a:endParaRPr lang="en-US" dirty="0"/>
+          </a:p>
+        </p:txBody>
+      </p:sp>
+      <p:sp>
+        <p:nvSpPr>
+          <p:cNvPr id="5" name="Slide Number Placeholder 4"/>
+          <p:cNvSpPr>
+            <a:spLocks noGrp="1"/>
+          </p:cNvSpPr>
+          <p:nvPr>
+            <p:ph type="sldNum" sz="quarter" idx="12"/>
+          </p:nvPr>
+        </p:nvSpPr>
+        <p:spPr/>
+        <p:txBody>
+          <a:bodyPr/>
+          <a:lstStyle/>
+          <a:p>
+            <a:fld id="{40B5302D-D599-4E77-A491-74C15852037A}" type="slidenum">
+              <a:rPr lang="en-US" smtClean="0"/>
+              <a:t>3</a:t>
+            </a:fld>
+            <a:endParaRPr lang="en-US"/>
+          </a:p>
+        </p:txBody>
+      </p:sp>
       <p:pic>
         <p:nvPicPr>
-          <p:cNvPr id="9" name="Content Placeholder 8"/>
+          <p:cNvPr id="8" name="Picture 7"/>
           <p:cNvPicPr>
-            <a:picLocks noGrp="1" noChangeAspect="1"/>
+            <a:picLocks noChangeAspect="1"/>
           </p:cNvPicPr>
-          <p:nvPr>
-            <p:ph sz="half" idx="2"/>
-          </p:nvPr>
+          <p:nvPr/>
         </p:nvPicPr>
         <p:blipFill rotWithShape="1">
           <a:blip r:embed="rId2">
@@ -7434,53 +7483,26 @@
               </a:ext>
             </a:extLst>
           </a:blip>
-          <a:srcRect l="3031" t="6589" r="6265" b="5158"/>
+          <a:srcRect t="7319" r="5978" b="-1047"/>
           <a:stretch/>
         </p:blipFill>
         <p:spPr>
           <a:xfrm>
-            <a:off x="-76200" y="2438400"/>
-            <a:ext cx="4561726" cy="2958958"/>
+            <a:off x="4428445" y="2478869"/>
+            <a:ext cx="4410755" cy="2931331"/>
           </a:xfrm>
+          <a:prstGeom prst="rect">
+            <a:avLst/>
+          </a:prstGeom>
         </p:spPr>
       </p:pic>
-      <p:sp>
-        <p:nvSpPr>
-          <p:cNvPr id="7" name="Text Placeholder 6"/>
-          <p:cNvSpPr>
-            <a:spLocks noGrp="1"/>
-          </p:cNvSpPr>
-          <p:nvPr>
-            <p:ph type="body" sz="quarter" idx="3"/>
-          </p:nvPr>
-        </p:nvSpPr>
-        <p:spPr>
-          <a:xfrm>
-            <a:off x="5029200" y="1524000"/>
-            <a:ext cx="3657600" cy="639762"/>
-          </a:xfrm>
-        </p:spPr>
-        <p:txBody>
-          <a:bodyPr/>
-          <a:lstStyle/>
-          <a:p>
-            <a:r>
-              <a:rPr lang="en-US" dirty="0" smtClean="0"/>
-              <a:t>Overall Average’s Prediction</a:t>
-            </a:r>
-            <a:endParaRPr lang="en-US" dirty="0"/>
-          </a:p>
-        </p:txBody>
-      </p:sp>
       <p:pic>
         <p:nvPicPr>
-          <p:cNvPr id="10" name="Content Placeholder 9"/>
+          <p:cNvPr id="6" name="Picture 5"/>
           <p:cNvPicPr>
-            <a:picLocks noGrp="1" noChangeAspect="1"/>
+            <a:picLocks noChangeAspect="1"/>
           </p:cNvPicPr>
-          <p:nvPr>
-            <p:ph sz="quarter" idx="4"/>
-          </p:nvPr>
+          <p:nvPr/>
         </p:nvPicPr>
         <p:blipFill rotWithShape="1">
           <a:blip r:embed="rId3">
@@ -7490,39 +7512,19 @@
               </a:ext>
             </a:extLst>
           </a:blip>
-          <a:srcRect l="4373" t="7256" r="6906" b="5052"/>
+          <a:srcRect t="7134" r="6000"/>
           <a:stretch/>
         </p:blipFill>
         <p:spPr>
           <a:xfrm>
-            <a:off x="4419600" y="2514600"/>
-            <a:ext cx="4428161" cy="2917861"/>
+            <a:off x="1" y="2438400"/>
+            <a:ext cx="4450718" cy="2931331"/>
           </a:xfrm>
+          <a:prstGeom prst="rect">
+            <a:avLst/>
+          </a:prstGeom>
         </p:spPr>
       </p:pic>
-      <p:sp>
-        <p:nvSpPr>
-          <p:cNvPr id="5" name="Slide Number Placeholder 4"/>
-          <p:cNvSpPr>
-            <a:spLocks noGrp="1"/>
-          </p:cNvSpPr>
-          <p:nvPr>
-            <p:ph type="sldNum" sz="quarter" idx="12"/>
-          </p:nvPr>
-        </p:nvSpPr>
-        <p:spPr/>
-        <p:txBody>
-          <a:bodyPr/>
-          <a:lstStyle/>
-          <a:p>
-            <a:fld id="{40B5302D-D599-4E77-A491-74C15852037A}" type="slidenum">
-              <a:rPr lang="en-US" smtClean="0"/>
-              <a:t>3</a:t>
-            </a:fld>
-            <a:endParaRPr lang="en-US"/>
-          </a:p>
-        </p:txBody>
-      </p:sp>
     </p:spTree>
     <p:extLst>
       <p:ext uri="{BB962C8B-B14F-4D97-AF65-F5344CB8AC3E}">

</xml_diff>